<commit_message>
chore: Comentar importaciones no utilizadas y mejorar la búsqueda de himnos
</commit_message>
<xml_diff>
--- a/DEXAH_output.pptx
+++ b/DEXAH_output.pptx
@@ -11,6 +11,29 @@
     <p:sldId id="259" r:id="rId9"/>
     <p:sldId id="260" r:id="rId10"/>
     <p:sldId id="261" r:id="rId11"/>
+    <p:sldId id="262" r:id="rId12"/>
+    <p:sldId id="263" r:id="rId13"/>
+    <p:sldId id="264" r:id="rId14"/>
+    <p:sldId id="265" r:id="rId15"/>
+    <p:sldId id="266" r:id="rId16"/>
+    <p:sldId id="267" r:id="rId17"/>
+    <p:sldId id="268" r:id="rId18"/>
+    <p:sldId id="269" r:id="rId19"/>
+    <p:sldId id="270" r:id="rId20"/>
+    <p:sldId id="271" r:id="rId21"/>
+    <p:sldId id="272" r:id="rId22"/>
+    <p:sldId id="273" r:id="rId23"/>
+    <p:sldId id="274" r:id="rId24"/>
+    <p:sldId id="275" r:id="rId25"/>
+    <p:sldId id="276" r:id="rId26"/>
+    <p:sldId id="277" r:id="rId27"/>
+    <p:sldId id="278" r:id="rId28"/>
+    <p:sldId id="279" r:id="rId29"/>
+    <p:sldId id="280" r:id="rId30"/>
+    <p:sldId id="281" r:id="rId31"/>
+    <p:sldId id="282" r:id="rId32"/>
+    <p:sldId id="283" r:id="rId33"/>
+    <p:sldId id="284" r:id="rId34"/>
   </p:sldIdLst>
   <p:sldSz cx="12192000" cy="6858000"/>
   <p:notesSz cx="6858000" cy="9144000"/>
@@ -3365,6 +3388,413 @@
 </p:sld>
 </file>
 
+<file path=ppt/slides/slide10.xml><?xml version="1.0" encoding="utf-8"?>
+<p:sld xmlns:a="http://schemas.openxmlformats.org/drawingml/2006/main" xmlns:p="http://schemas.openxmlformats.org/presentationml/2006/main" xmlns:r="http://schemas.openxmlformats.org/officeDocument/2006/relationships">
+  <p:cSld>
+    <p:spTree>
+      <p:nvGrpSpPr>
+        <p:cNvPr id="1" name=""/>
+        <p:cNvGrpSpPr/>
+        <p:nvPr/>
+      </p:nvGrpSpPr>
+      <p:grpSpPr/>
+      <p:sp>
+        <p:nvSpPr>
+          <p:cNvPr id="2" name="Title 1"/>
+          <p:cNvSpPr>
+            <a:spLocks noGrp="1"/>
+          </p:cNvSpPr>
+          <p:nvPr>
+            <p:ph type="ctrTitle"/>
+          </p:nvPr>
+        </p:nvSpPr>
+        <p:spPr/>
+        <p:txBody>
+          <a:bodyPr/>
+          <a:lstStyle/>
+          <a:p>
+            <a:r>
+              <a:t>Fue Tu gracia</a:t>
+            </a:r>
+          </a:p>
+        </p:txBody>
+      </p:sp>
+      <p:sp>
+        <p:nvSpPr>
+          <p:cNvPr id="3" name="Subtitle 2"/>
+          <p:cNvSpPr>
+            <a:spLocks noGrp="1"/>
+          </p:cNvSpPr>
+          <p:nvPr>
+            <p:ph type="subTitle" idx="1"/>
+          </p:nvPr>
+        </p:nvSpPr>
+        <p:spPr/>
+        <p:txBody>
+          <a:bodyPr/>
+          <a:lstStyle/>
+          <a:p>
+            <a:r>
+              <a:t>48 - Himnario Gracia</a:t>
+            </a:r>
+          </a:p>
+        </p:txBody>
+      </p:sp>
+    </p:spTree>
+  </p:cSld>
+  <p:clrMapOvr>
+    <a:masterClrMapping/>
+  </p:clrMapOvr>
+</p:sld>
+</file>
+
+<file path=ppt/slides/slide11.xml><?xml version="1.0" encoding="utf-8"?>
+<p:sld xmlns:a="http://schemas.openxmlformats.org/drawingml/2006/main" xmlns:p="http://schemas.openxmlformats.org/presentationml/2006/main" xmlns:r="http://schemas.openxmlformats.org/officeDocument/2006/relationships">
+  <p:cSld>
+    <p:spTree>
+      <p:nvGrpSpPr>
+        <p:cNvPr id="1" name=""/>
+        <p:cNvGrpSpPr/>
+        <p:nvPr/>
+      </p:nvGrpSpPr>
+      <p:grpSpPr/>
+      <p:sp>
+        <p:nvSpPr>
+          <p:cNvPr id="2" name="Title 1"/>
+          <p:cNvSpPr>
+            <a:spLocks noGrp="1"/>
+          </p:cNvSpPr>
+          <p:nvPr>
+            <p:ph type="title"/>
+          </p:nvPr>
+        </p:nvSpPr>
+        <p:spPr/>
+        <p:txBody>
+          <a:bodyPr/>
+          <a:lstStyle/>
+          <a:p>
+            <a:r>
+              <a:t>  Siendo yo un pecador, Extraviado en el error; Incapaz fui de quitar la culpa que cargaba Mi corazón. </a:t>
+            </a:r>
+          </a:p>
+        </p:txBody>
+      </p:sp>
+    </p:spTree>
+  </p:cSld>
+  <p:clrMapOvr>
+    <a:masterClrMapping/>
+  </p:clrMapOvr>
+</p:sld>
+</file>
+
+<file path=ppt/slides/slide12.xml><?xml version="1.0" encoding="utf-8"?>
+<p:sld xmlns:a="http://schemas.openxmlformats.org/drawingml/2006/main" xmlns:p="http://schemas.openxmlformats.org/presentationml/2006/main" xmlns:r="http://schemas.openxmlformats.org/officeDocument/2006/relationships">
+  <p:cSld>
+    <p:spTree>
+      <p:nvGrpSpPr>
+        <p:cNvPr id="1" name=""/>
+        <p:cNvGrpSpPr/>
+        <p:nvPr/>
+      </p:nvGrpSpPr>
+      <p:grpSpPr/>
+      <p:sp>
+        <p:nvSpPr>
+          <p:cNvPr id="2" name="Title 1"/>
+          <p:cNvSpPr>
+            <a:spLocks noGrp="1"/>
+          </p:cNvSpPr>
+          <p:nvPr>
+            <p:ph type="title"/>
+          </p:nvPr>
+        </p:nvSpPr>
+        <p:spPr/>
+        <p:txBody>
+          <a:bodyPr/>
+          <a:lstStyle/>
+          <a:p>
+            <a:r>
+              <a:t> Fue Tu gracia Que mi vida renovó, Fue Tu gracia Que mi deuda canceló, Fue Tu gracia Que de muerte me llevó A vivir para Tu gloria, oh Señor. </a:t>
+            </a:r>
+          </a:p>
+        </p:txBody>
+      </p:sp>
+    </p:spTree>
+  </p:cSld>
+  <p:clrMapOvr>
+    <a:masterClrMapping/>
+  </p:clrMapOvr>
+</p:sld>
+</file>
+
+<file path=ppt/slides/slide13.xml><?xml version="1.0" encoding="utf-8"?>
+<p:sld xmlns:a="http://schemas.openxmlformats.org/drawingml/2006/main" xmlns:p="http://schemas.openxmlformats.org/presentationml/2006/main" xmlns:r="http://schemas.openxmlformats.org/officeDocument/2006/relationships">
+  <p:cSld>
+    <p:spTree>
+      <p:nvGrpSpPr>
+        <p:cNvPr id="1" name=""/>
+        <p:cNvGrpSpPr/>
+        <p:nvPr/>
+      </p:nvGrpSpPr>
+      <p:grpSpPr/>
+      <p:sp>
+        <p:nvSpPr>
+          <p:cNvPr id="2" name="Title 1"/>
+          <p:cNvSpPr>
+            <a:spLocks noGrp="1"/>
+          </p:cNvSpPr>
+          <p:nvPr>
+            <p:ph type="title"/>
+          </p:nvPr>
+        </p:nvSpPr>
+        <p:spPr/>
+        <p:txBody>
+          <a:bodyPr/>
+          <a:lstStyle/>
+          <a:p>
+            <a:r>
+              <a:t> ¿Tu gracia, quién puede medir? Tu amor no tiene uno igual. Cuando perdido estaba yo viniste a mi encuentro, Mi Salvador.(Coro) </a:t>
+            </a:r>
+          </a:p>
+        </p:txBody>
+      </p:sp>
+    </p:spTree>
+  </p:cSld>
+  <p:clrMapOvr>
+    <a:masterClrMapping/>
+  </p:clrMapOvr>
+</p:sld>
+</file>
+
+<file path=ppt/slides/slide14.xml><?xml version="1.0" encoding="utf-8"?>
+<p:sld xmlns:a="http://schemas.openxmlformats.org/drawingml/2006/main" xmlns:p="http://schemas.openxmlformats.org/presentationml/2006/main" xmlns:r="http://schemas.openxmlformats.org/officeDocument/2006/relationships">
+  <p:cSld>
+    <p:spTree>
+      <p:nvGrpSpPr>
+        <p:cNvPr id="1" name=""/>
+        <p:cNvGrpSpPr/>
+        <p:nvPr/>
+      </p:nvGrpSpPr>
+      <p:grpSpPr/>
+      <p:sp>
+        <p:nvSpPr>
+          <p:cNvPr id="2" name="Title 1"/>
+          <p:cNvSpPr>
+            <a:spLocks noGrp="1"/>
+          </p:cNvSpPr>
+          <p:nvPr>
+            <p:ph type="title"/>
+          </p:nvPr>
+        </p:nvSpPr>
+        <p:spPr/>
+        <p:txBody>
+          <a:bodyPr/>
+          <a:lstStyle/>
+          <a:p>
+            <a:r>
+              <a:t> Fue Tu gracia Que mi vida renovó, Fue Tu gracia Que mi deuda canceló, Fue Tu gracia Que de muerte me llevó A vivir para Tu gloria, oh Señor. </a:t>
+            </a:r>
+          </a:p>
+        </p:txBody>
+      </p:sp>
+    </p:spTree>
+  </p:cSld>
+  <p:clrMapOvr>
+    <a:masterClrMapping/>
+  </p:clrMapOvr>
+</p:sld>
+</file>
+
+<file path=ppt/slides/slide15.xml><?xml version="1.0" encoding="utf-8"?>
+<p:sld xmlns:a="http://schemas.openxmlformats.org/drawingml/2006/main" xmlns:p="http://schemas.openxmlformats.org/presentationml/2006/main" xmlns:r="http://schemas.openxmlformats.org/officeDocument/2006/relationships">
+  <p:cSld>
+    <p:spTree>
+      <p:nvGrpSpPr>
+        <p:cNvPr id="1" name=""/>
+        <p:cNvGrpSpPr/>
+        <p:nvPr/>
+      </p:nvGrpSpPr>
+      <p:grpSpPr/>
+      <p:sp>
+        <p:nvSpPr>
+          <p:cNvPr id="2" name="Title 1"/>
+          <p:cNvSpPr>
+            <a:spLocks noGrp="1"/>
+          </p:cNvSpPr>
+          <p:nvPr>
+            <p:ph type="title"/>
+          </p:nvPr>
+        </p:nvSpPr>
+        <p:spPr/>
+        <p:txBody>
+          <a:bodyPr/>
+          <a:lstStyle/>
+          <a:p>
+            <a:r>
+              <a:t> En la cruz donde murió El perfecto Hijo de Dios, La sentencia Él sufrió, la que yo merecía Por mi maldad. (Coro) </a:t>
+            </a:r>
+          </a:p>
+        </p:txBody>
+      </p:sp>
+    </p:spTree>
+  </p:cSld>
+  <p:clrMapOvr>
+    <a:masterClrMapping/>
+  </p:clrMapOvr>
+</p:sld>
+</file>
+
+<file path=ppt/slides/slide16.xml><?xml version="1.0" encoding="utf-8"?>
+<p:sld xmlns:a="http://schemas.openxmlformats.org/drawingml/2006/main" xmlns:p="http://schemas.openxmlformats.org/presentationml/2006/main" xmlns:r="http://schemas.openxmlformats.org/officeDocument/2006/relationships">
+  <p:cSld>
+    <p:spTree>
+      <p:nvGrpSpPr>
+        <p:cNvPr id="1" name=""/>
+        <p:cNvGrpSpPr/>
+        <p:nvPr/>
+      </p:nvGrpSpPr>
+      <p:grpSpPr/>
+      <p:sp>
+        <p:nvSpPr>
+          <p:cNvPr id="2" name="Title 1"/>
+          <p:cNvSpPr>
+            <a:spLocks noGrp="1"/>
+          </p:cNvSpPr>
+          <p:nvPr>
+            <p:ph type="title"/>
+          </p:nvPr>
+        </p:nvSpPr>
+        <p:spPr/>
+        <p:txBody>
+          <a:bodyPr/>
+          <a:lstStyle/>
+          <a:p>
+            <a:r>
+              <a:t> Fue Tu gracia Que mi vida renovó, Fue Tu gracia Que mi deuda canceló, Fue Tu gracia Que de muerte me llevó A vivir para Tu gloria, oh Señor. </a:t>
+            </a:r>
+          </a:p>
+        </p:txBody>
+      </p:sp>
+    </p:spTree>
+  </p:cSld>
+  <p:clrMapOvr>
+    <a:masterClrMapping/>
+  </p:clrMapOvr>
+</p:sld>
+</file>
+
+<file path=ppt/slides/slide17.xml><?xml version="1.0" encoding="utf-8"?>
+<p:sld xmlns:a="http://schemas.openxmlformats.org/drawingml/2006/main" xmlns:p="http://schemas.openxmlformats.org/presentationml/2006/main" xmlns:r="http://schemas.openxmlformats.org/officeDocument/2006/relationships">
+  <p:cSld>
+    <p:spTree>
+      <p:nvGrpSpPr>
+        <p:cNvPr id="1" name=""/>
+        <p:cNvGrpSpPr/>
+        <p:nvPr/>
+      </p:nvGrpSpPr>
+      <p:grpSpPr/>
+      <p:sp>
+        <p:nvSpPr>
+          <p:cNvPr id="2" name="Title 1"/>
+          <p:cNvSpPr>
+            <a:spLocks noGrp="1"/>
+          </p:cNvSpPr>
+          <p:nvPr>
+            <p:ph type="title"/>
+          </p:nvPr>
+        </p:nvSpPr>
+        <p:spPr/>
+        <p:txBody>
+          <a:bodyPr/>
+          <a:lstStyle/>
+          <a:p>
+            <a:r>
+              <a:t> Tu gracia me ha traído aquí, De rodillas ante Ti; Maravillado al comprender que a Tu Hijo entregaste En mi lugar. (Coro)  </a:t>
+            </a:r>
+          </a:p>
+        </p:txBody>
+      </p:sp>
+    </p:spTree>
+  </p:cSld>
+  <p:clrMapOvr>
+    <a:masterClrMapping/>
+  </p:clrMapOvr>
+</p:sld>
+</file>
+
+<file path=ppt/slides/slide18.xml><?xml version="1.0" encoding="utf-8"?>
+<p:sld xmlns:a="http://schemas.openxmlformats.org/drawingml/2006/main" xmlns:p="http://schemas.openxmlformats.org/presentationml/2006/main" xmlns:r="http://schemas.openxmlformats.org/officeDocument/2006/relationships">
+  <p:cSld>
+    <p:spTree>
+      <p:nvGrpSpPr>
+        <p:cNvPr id="1" name=""/>
+        <p:cNvGrpSpPr/>
+        <p:nvPr/>
+      </p:nvGrpSpPr>
+      <p:grpSpPr/>
+      <p:sp>
+        <p:nvSpPr>
+          <p:cNvPr id="2" name="Title 1"/>
+          <p:cNvSpPr>
+            <a:spLocks noGrp="1"/>
+          </p:cNvSpPr>
+          <p:nvPr>
+            <p:ph type="title"/>
+          </p:nvPr>
+        </p:nvSpPr>
+        <p:spPr/>
+        <p:txBody>
+          <a:bodyPr/>
+          <a:lstStyle/>
+          <a:p>
+            <a:r>
+              <a:t> Fue Tu gracia Que mi vida renovó, Fue Tu gracia Que mi deuda canceló, Fue Tu gracia Que de muerte me llevó A vivir para Tu gloria, oh Señor. </a:t>
+            </a:r>
+          </a:p>
+        </p:txBody>
+      </p:sp>
+    </p:spTree>
+  </p:cSld>
+  <p:clrMapOvr>
+    <a:masterClrMapping/>
+  </p:clrMapOvr>
+</p:sld>
+</file>
+
+<file path=ppt/slides/slide19.xml><?xml version="1.0" encoding="utf-8"?>
+<p:sld xmlns:a="http://schemas.openxmlformats.org/drawingml/2006/main" xmlns:p="http://schemas.openxmlformats.org/presentationml/2006/main" xmlns:r="http://schemas.openxmlformats.org/officeDocument/2006/relationships">
+  <p:cSld>
+    <p:spTree>
+      <p:nvGrpSpPr>
+        <p:cNvPr id="1" name=""/>
+        <p:cNvGrpSpPr/>
+        <p:nvPr/>
+      </p:nvGrpSpPr>
+      <p:grpSpPr/>
+      <p:sp>
+        <p:nvSpPr>
+          <p:cNvPr id="2" name="Title 1"/>
+          <p:cNvSpPr>
+            <a:spLocks noGrp="1"/>
+          </p:cNvSpPr>
+          <p:nvPr>
+            <p:ph type="title"/>
+          </p:nvPr>
+        </p:nvSpPr>
+        <p:spPr/>
+        <p:txBody>
+          <a:bodyPr/>
+          <a:lstStyle/>
+          <a:p/>
+        </p:txBody>
+      </p:sp>
+    </p:spTree>
+  </p:cSld>
+  <p:clrMapOvr>
+    <a:masterClrMapping/>
+  </p:clrMapOvr>
+</p:sld>
+</file>
+
 <file path=ppt/slides/slide2.xml><?xml version="1.0" encoding="utf-8"?>
 <p:sld xmlns:a="http://schemas.openxmlformats.org/drawingml/2006/main" xmlns:p="http://schemas.openxmlformats.org/presentationml/2006/main" xmlns:r="http://schemas.openxmlformats.org/officeDocument/2006/relationships">
   <p:cSld>
@@ -3391,7 +3821,7 @@
           <a:lstStyle/>
           <a:p>
             <a:r>
-              <a:t>CON CÁNTICOS, SEÑOR</a:t>
+              <a:t>TE AMO, REY</a:t>
             </a:r>
           </a:p>
         </p:txBody>
@@ -3412,7 +3842,414 @@
           <a:lstStyle/>
           <a:p>
             <a:r>
-              <a:t>1 - Himnario Majestuoso</a:t>
+              <a:t>46 - Himnario Majestuoso</a:t>
+            </a:r>
+          </a:p>
+        </p:txBody>
+      </p:sp>
+    </p:spTree>
+  </p:cSld>
+  <p:clrMapOvr>
+    <a:masterClrMapping/>
+  </p:clrMapOvr>
+</p:sld>
+</file>
+
+<file path=ppt/slides/slide20.xml><?xml version="1.0" encoding="utf-8"?>
+<p:sld xmlns:a="http://schemas.openxmlformats.org/drawingml/2006/main" xmlns:p="http://schemas.openxmlformats.org/presentationml/2006/main" xmlns:r="http://schemas.openxmlformats.org/officeDocument/2006/relationships">
+  <p:cSld>
+    <p:spTree>
+      <p:nvGrpSpPr>
+        <p:cNvPr id="1" name=""/>
+        <p:cNvGrpSpPr/>
+        <p:nvPr/>
+      </p:nvGrpSpPr>
+      <p:grpSpPr/>
+      <p:sp>
+        <p:nvSpPr>
+          <p:cNvPr id="2" name="Title 1"/>
+          <p:cNvSpPr>
+            <a:spLocks noGrp="1"/>
+          </p:cNvSpPr>
+          <p:nvPr>
+            <p:ph type="title"/>
+          </p:nvPr>
+        </p:nvSpPr>
+        <p:spPr/>
+        <p:txBody>
+          <a:bodyPr/>
+          <a:lstStyle/>
+          <a:p>
+            <a:r>
+              <a:t> Fue Tu gracia Que mi vida renovó, Fue Tu gracia Que mi deuda canceló, Fue Tu gracia Que de muerte me llevó A vivir para Tu gloria, oh Señor. </a:t>
+            </a:r>
+          </a:p>
+        </p:txBody>
+      </p:sp>
+    </p:spTree>
+  </p:cSld>
+  <p:clrMapOvr>
+    <a:masterClrMapping/>
+  </p:clrMapOvr>
+</p:sld>
+</file>
+
+<file path=ppt/slides/slide21.xml><?xml version="1.0" encoding="utf-8"?>
+<p:sld xmlns:a="http://schemas.openxmlformats.org/drawingml/2006/main" xmlns:p="http://schemas.openxmlformats.org/presentationml/2006/main" xmlns:r="http://schemas.openxmlformats.org/officeDocument/2006/relationships">
+  <p:cSld>
+    <p:spTree>
+      <p:nvGrpSpPr>
+        <p:cNvPr id="1" name=""/>
+        <p:cNvGrpSpPr/>
+        <p:nvPr/>
+      </p:nvGrpSpPr>
+      <p:grpSpPr/>
+      <p:sp>
+        <p:nvSpPr>
+          <p:cNvPr id="2" name="Title 1"/>
+          <p:cNvSpPr>
+            <a:spLocks noGrp="1"/>
+          </p:cNvSpPr>
+          <p:nvPr>
+            <p:ph type="ctrTitle"/>
+          </p:nvPr>
+        </p:nvSpPr>
+        <p:spPr/>
+        <p:txBody>
+          <a:bodyPr/>
+          <a:lstStyle/>
+          <a:p>
+            <a:r>
+              <a:t>Mi vida es Cristo</a:t>
+            </a:r>
+          </a:p>
+        </p:txBody>
+      </p:sp>
+      <p:sp>
+        <p:nvSpPr>
+          <p:cNvPr id="3" name="Subtitle 2"/>
+          <p:cNvSpPr>
+            <a:spLocks noGrp="1"/>
+          </p:cNvSpPr>
+          <p:nvPr>
+            <p:ph type="subTitle" idx="1"/>
+          </p:nvPr>
+        </p:nvSpPr>
+        <p:spPr/>
+        <p:txBody>
+          <a:bodyPr/>
+          <a:lstStyle/>
+          <a:p>
+            <a:r>
+              <a:t>143 - Himnario Gracia</a:t>
+            </a:r>
+          </a:p>
+        </p:txBody>
+      </p:sp>
+    </p:spTree>
+  </p:cSld>
+  <p:clrMapOvr>
+    <a:masterClrMapping/>
+  </p:clrMapOvr>
+</p:sld>
+</file>
+
+<file path=ppt/slides/slide22.xml><?xml version="1.0" encoding="utf-8"?>
+<p:sld xmlns:a="http://schemas.openxmlformats.org/drawingml/2006/main" xmlns:p="http://schemas.openxmlformats.org/presentationml/2006/main" xmlns:r="http://schemas.openxmlformats.org/officeDocument/2006/relationships">
+  <p:cSld>
+    <p:spTree>
+      <p:nvGrpSpPr>
+        <p:cNvPr id="1" name=""/>
+        <p:cNvGrpSpPr/>
+        <p:nvPr/>
+      </p:nvGrpSpPr>
+      <p:grpSpPr/>
+      <p:sp>
+        <p:nvSpPr>
+          <p:cNvPr id="2" name="Title 1"/>
+          <p:cNvSpPr>
+            <a:spLocks noGrp="1"/>
+          </p:cNvSpPr>
+          <p:nvPr>
+            <p:ph type="title"/>
+          </p:nvPr>
+        </p:nvSpPr>
+        <p:spPr/>
+        <p:txBody>
+          <a:bodyPr/>
+          <a:lstStyle/>
+          <a:p>
+            <a:r>
+              <a:t>  En densa oscuridad vagué, perdido en el error; La senda vana del placer a muerte me llevó. Siendo rebelde a Tu voz quisiste amarme así; De no haber sido por Tu amor aún huiría de Ti. </a:t>
+            </a:r>
+          </a:p>
+        </p:txBody>
+      </p:sp>
+    </p:spTree>
+  </p:cSld>
+  <p:clrMapOvr>
+    <a:masterClrMapping/>
+  </p:clrMapOvr>
+</p:sld>
+</file>
+
+<file path=ppt/slides/slide23.xml><?xml version="1.0" encoding="utf-8"?>
+<p:sld xmlns:a="http://schemas.openxmlformats.org/drawingml/2006/main" xmlns:p="http://schemas.openxmlformats.org/presentationml/2006/main" xmlns:r="http://schemas.openxmlformats.org/officeDocument/2006/relationships">
+  <p:cSld>
+    <p:spTree>
+      <p:nvGrpSpPr>
+        <p:cNvPr id="1" name=""/>
+        <p:cNvGrpSpPr/>
+        <p:nvPr/>
+      </p:nvGrpSpPr>
+      <p:grpSpPr/>
+      <p:sp>
+        <p:nvSpPr>
+          <p:cNvPr id="2" name="Title 1"/>
+          <p:cNvSpPr>
+            <a:spLocks noGrp="1"/>
+          </p:cNvSpPr>
+          <p:nvPr>
+            <p:ph type="title"/>
+          </p:nvPr>
+        </p:nvSpPr>
+        <p:spPr/>
+        <p:txBody>
+          <a:bodyPr/>
+          <a:lstStyle/>
+          <a:p>
+            <a:r>
+              <a:t> //¡Aleluya! Mi vida es Cristo. ¡Aleluya! Jesús es mi todo.//  </a:t>
+            </a:r>
+          </a:p>
+        </p:txBody>
+      </p:sp>
+    </p:spTree>
+  </p:cSld>
+  <p:clrMapOvr>
+    <a:masterClrMapping/>
+  </p:clrMapOvr>
+</p:sld>
+</file>
+
+<file path=ppt/slides/slide24.xml><?xml version="1.0" encoding="utf-8"?>
+<p:sld xmlns:a="http://schemas.openxmlformats.org/drawingml/2006/main" xmlns:p="http://schemas.openxmlformats.org/presentationml/2006/main" xmlns:r="http://schemas.openxmlformats.org/officeDocument/2006/relationships">
+  <p:cSld>
+    <p:spTree>
+      <p:nvGrpSpPr>
+        <p:cNvPr id="1" name=""/>
+        <p:cNvGrpSpPr/>
+        <p:nvPr/>
+      </p:nvGrpSpPr>
+      <p:grpSpPr/>
+      <p:sp>
+        <p:nvSpPr>
+          <p:cNvPr id="2" name="Title 1"/>
+          <p:cNvSpPr>
+            <a:spLocks noGrp="1"/>
+          </p:cNvSpPr>
+          <p:nvPr>
+            <p:ph type="title"/>
+          </p:nvPr>
+        </p:nvSpPr>
+        <p:spPr/>
+        <p:txBody>
+          <a:bodyPr/>
+          <a:lstStyle/>
+          <a:p>
+            <a:r>
+              <a:t> En rumbo a mi perdición, indiferente aún. De mí tuviste compasión, me guiaste a la cruz; Y contemplé Tu gran bondad: sufriste Tú por mí; Al Tú morir en mi lugar Tu gracia recibí. </a:t>
+            </a:r>
+          </a:p>
+        </p:txBody>
+      </p:sp>
+    </p:spTree>
+  </p:cSld>
+  <p:clrMapOvr>
+    <a:masterClrMapping/>
+  </p:clrMapOvr>
+</p:sld>
+</file>
+
+<file path=ppt/slides/slide25.xml><?xml version="1.0" encoding="utf-8"?>
+<p:sld xmlns:a="http://schemas.openxmlformats.org/drawingml/2006/main" xmlns:p="http://schemas.openxmlformats.org/presentationml/2006/main" xmlns:r="http://schemas.openxmlformats.org/officeDocument/2006/relationships">
+  <p:cSld>
+    <p:spTree>
+      <p:nvGrpSpPr>
+        <p:cNvPr id="1" name=""/>
+        <p:cNvGrpSpPr/>
+        <p:nvPr/>
+      </p:nvGrpSpPr>
+      <p:grpSpPr/>
+      <p:sp>
+        <p:nvSpPr>
+          <p:cNvPr id="2" name="Title 1"/>
+          <p:cNvSpPr>
+            <a:spLocks noGrp="1"/>
+          </p:cNvSpPr>
+          <p:nvPr>
+            <p:ph type="title"/>
+          </p:nvPr>
+        </p:nvSpPr>
+        <p:spPr/>
+        <p:txBody>
+          <a:bodyPr/>
+          <a:lstStyle/>
+          <a:p>
+            <a:r>
+              <a:t> //¡Aleluya! Mi vida es Cristo. ¡Aleluya! Jesús es mi todo.//  </a:t>
+            </a:r>
+          </a:p>
+        </p:txBody>
+      </p:sp>
+    </p:spTree>
+  </p:cSld>
+  <p:clrMapOvr>
+    <a:masterClrMapping/>
+  </p:clrMapOvr>
+</p:sld>
+</file>
+
+<file path=ppt/slides/slide26.xml><?xml version="1.0" encoding="utf-8"?>
+<p:sld xmlns:a="http://schemas.openxmlformats.org/drawingml/2006/main" xmlns:p="http://schemas.openxmlformats.org/presentationml/2006/main" xmlns:r="http://schemas.openxmlformats.org/officeDocument/2006/relationships">
+  <p:cSld>
+    <p:spTree>
+      <p:nvGrpSpPr>
+        <p:cNvPr id="1" name=""/>
+        <p:cNvGrpSpPr/>
+        <p:nvPr/>
+      </p:nvGrpSpPr>
+      <p:grpSpPr/>
+      <p:sp>
+        <p:nvSpPr>
+          <p:cNvPr id="2" name="Title 1"/>
+          <p:cNvSpPr>
+            <a:spLocks noGrp="1"/>
+          </p:cNvSpPr>
+          <p:nvPr>
+            <p:ph type="title"/>
+          </p:nvPr>
+        </p:nvSpPr>
+        <p:spPr/>
+        <p:txBody>
+          <a:bodyPr/>
+          <a:lstStyle/>
+          <a:p>
+            <a:r>
+              <a:t> Ahora Señor Tuyo seré, y viviré por Ti. Tus mandamientos seguiré por Tu poder en mí. Usa mi vida, oh Señor, como lo quieras Tú; Y que sea siempre mi canción: "Mi gloria eres Tú." </a:t>
+            </a:r>
+          </a:p>
+        </p:txBody>
+      </p:sp>
+    </p:spTree>
+  </p:cSld>
+  <p:clrMapOvr>
+    <a:masterClrMapping/>
+  </p:clrMapOvr>
+</p:sld>
+</file>
+
+<file path=ppt/slides/slide27.xml><?xml version="1.0" encoding="utf-8"?>
+<p:sld xmlns:a="http://schemas.openxmlformats.org/drawingml/2006/main" xmlns:p="http://schemas.openxmlformats.org/presentationml/2006/main" xmlns:r="http://schemas.openxmlformats.org/officeDocument/2006/relationships">
+  <p:cSld>
+    <p:spTree>
+      <p:nvGrpSpPr>
+        <p:cNvPr id="1" name=""/>
+        <p:cNvGrpSpPr/>
+        <p:nvPr/>
+      </p:nvGrpSpPr>
+      <p:grpSpPr/>
+      <p:sp>
+        <p:nvSpPr>
+          <p:cNvPr id="2" name="Title 1"/>
+          <p:cNvSpPr>
+            <a:spLocks noGrp="1"/>
+          </p:cNvSpPr>
+          <p:nvPr>
+            <p:ph type="title"/>
+          </p:nvPr>
+        </p:nvSpPr>
+        <p:spPr/>
+        <p:txBody>
+          <a:bodyPr/>
+          <a:lstStyle/>
+          <a:p>
+            <a:r>
+              <a:t> //¡Aleluya! Mi vida es Cristo. ¡Aleluya! Jesús es mi todo.//  </a:t>
+            </a:r>
+          </a:p>
+        </p:txBody>
+      </p:sp>
+    </p:spTree>
+  </p:cSld>
+  <p:clrMapOvr>
+    <a:masterClrMapping/>
+  </p:clrMapOvr>
+</p:sld>
+</file>
+
+<file path=ppt/slides/slide28.xml><?xml version="1.0" encoding="utf-8"?>
+<p:sld xmlns:a="http://schemas.openxmlformats.org/drawingml/2006/main" xmlns:p="http://schemas.openxmlformats.org/presentationml/2006/main" xmlns:r="http://schemas.openxmlformats.org/officeDocument/2006/relationships">
+  <p:cSld>
+    <p:spTree>
+      <p:nvGrpSpPr>
+        <p:cNvPr id="1" name=""/>
+        <p:cNvGrpSpPr/>
+        <p:nvPr/>
+      </p:nvGrpSpPr>
+      <p:grpSpPr/>
+      <p:sp>
+        <p:nvSpPr>
+          <p:cNvPr id="2" name="Title 1"/>
+          <p:cNvSpPr>
+            <a:spLocks noGrp="1"/>
+          </p:cNvSpPr>
+          <p:nvPr>
+            <p:ph type="title"/>
+          </p:nvPr>
+        </p:nvSpPr>
+        <p:spPr/>
+        <p:txBody>
+          <a:bodyPr/>
+          <a:lstStyle/>
+          <a:p/>
+        </p:txBody>
+      </p:sp>
+    </p:spTree>
+  </p:cSld>
+  <p:clrMapOvr>
+    <a:masterClrMapping/>
+  </p:clrMapOvr>
+</p:sld>
+</file>
+
+<file path=ppt/slides/slide29.xml><?xml version="1.0" encoding="utf-8"?>
+<p:sld xmlns:a="http://schemas.openxmlformats.org/drawingml/2006/main" xmlns:p="http://schemas.openxmlformats.org/presentationml/2006/main" xmlns:r="http://schemas.openxmlformats.org/officeDocument/2006/relationships">
+  <p:cSld>
+    <p:spTree>
+      <p:nvGrpSpPr>
+        <p:cNvPr id="1" name=""/>
+        <p:cNvGrpSpPr/>
+        <p:nvPr/>
+      </p:nvGrpSpPr>
+      <p:grpSpPr/>
+      <p:sp>
+        <p:nvSpPr>
+          <p:cNvPr id="2" name="Title 1"/>
+          <p:cNvSpPr>
+            <a:spLocks noGrp="1"/>
+          </p:cNvSpPr>
+          <p:nvPr>
+            <p:ph type="title"/>
+          </p:nvPr>
+        </p:nvSpPr>
+        <p:spPr/>
+        <p:txBody>
+          <a:bodyPr/>
+          <a:lstStyle/>
+          <a:p>
+            <a:r>
+              <a:t> //¡Aleluya! Mi vida es Cristo. ¡Aleluya! Jesús es mi todo.//  </a:t>
             </a:r>
           </a:p>
         </p:txBody>
@@ -3451,7 +4288,7 @@
           <a:lstStyle/>
           <a:p>
             <a:r>
-              <a:t>CON CÁNTICOS, SEÑOR, MI CORAZÓN Y VOZ TE ADORAN CON FERVOR, OH TRINO, SANTO DIOS. EN TU MANSIÓN YO TE VERÉ, DE TI PERDÓN FELIZ TENDRÉ.</a:t>
+              <a:t>Te amo Rey, y levanto mi voz, para adorarte, mi salvador. Me gozo en ti y te alabo mi Dios; dulce sea mi canto a ti, oh Señor.</a:t>
             </a:r>
           </a:p>
         </p:txBody>
@@ -3490,7 +4327,7 @@
           <a:lstStyle/>
           <a:p>
             <a:r>
-              <a:t>TU MANO PATERNAL MARCÓ MI SENDA AQUÍ; MIS PASOS, CADA CUAL, VELADOS SON POR TI. EN TU MANSIÓN YO TE VERÉ, DE TI PERDÓN FELIZ TENDRÉ.</a:t>
+              <a:t>Te amo Rey, y levanto mi voz, para adorar y gozar me en ti. Regocíjate y escucha, mi Rey: que sea un dulce sonar para ti.</a:t>
             </a:r>
           </a:p>
         </p:txBody>
@@ -3520,16 +4357,37 @@
             <a:spLocks noGrp="1"/>
           </p:cNvSpPr>
           <p:nvPr>
-            <p:ph type="title"/>
-          </p:nvPr>
-        </p:nvSpPr>
-        <p:spPr/>
-        <p:txBody>
-          <a:bodyPr/>
-          <a:lstStyle/>
-          <a:p>
-            <a:r>
-              <a:t>INNUMERABLES SON TUS BIENES Y SIN PAR; Y POR TU COMPASIÓN LOS GOZO SIN CESAR. EN TU MANSIÓN YO TE VERÉ, DE TI PERDÓN FELIZ TENDRÉ.</a:t>
+            <p:ph type="ctrTitle"/>
+          </p:nvPr>
+        </p:nvSpPr>
+        <p:spPr/>
+        <p:txBody>
+          <a:bodyPr/>
+          <a:lstStyle/>
+          <a:p>
+            <a:r>
+              <a:t>Dios descendió</a:t>
+            </a:r>
+          </a:p>
+        </p:txBody>
+      </p:sp>
+      <p:sp>
+        <p:nvSpPr>
+          <p:cNvPr id="3" name="Subtitle 2"/>
+          <p:cNvSpPr>
+            <a:spLocks noGrp="1"/>
+          </p:cNvSpPr>
+          <p:nvPr>
+            <p:ph type="subTitle" idx="1"/>
+          </p:nvPr>
+        </p:nvSpPr>
+        <p:spPr/>
+        <p:txBody>
+          <a:bodyPr/>
+          <a:lstStyle/>
+          <a:p>
+            <a:r>
+              <a:t>333 - Himnario Majestuoso</a:t>
             </a:r>
           </a:p>
         </p:txBody>
@@ -3568,7 +4426,134 @@
           <a:lstStyle/>
           <a:p>
             <a:r>
-              <a:t>TÚ ERES, ¡OH, SEÑOR! MI SUMO, TODO BIEN; MIL LENGUAS TU AMOR CANTANDO SIEMPRE ESTÉN. EN TU MANSIÓN YO TE VERÉ, DE TI PERDÓN FELIZ TENDRÉ.</a:t>
+              <a:t>Día tan grande no puedo olvidar, día de gloria sin par; cuando en tinieblas al verme andar, vino a salvar me el señor.</a:t>
+            </a:r>
+          </a:p>
+          <a:p>
+            <a:r>
+              <a:t> Gran compasión tuvo Cristo de mí, de gozo y paz me llenó. Quitó las sombras, oh gloria a su nombre, la noche en día a cambió.</a:t>
+            </a:r>
+          </a:p>
+        </p:txBody>
+      </p:sp>
+    </p:spTree>
+  </p:cSld>
+  <p:clrMapOvr>
+    <a:masterClrMapping/>
+  </p:clrMapOvr>
+</p:sld>
+</file>
+
+<file path=ppt/slides/slide7.xml><?xml version="1.0" encoding="utf-8"?>
+<p:sld xmlns:a="http://schemas.openxmlformats.org/drawingml/2006/main" xmlns:p="http://schemas.openxmlformats.org/presentationml/2006/main" xmlns:r="http://schemas.openxmlformats.org/officeDocument/2006/relationships">
+  <p:cSld>
+    <p:spTree>
+      <p:nvGrpSpPr>
+        <p:cNvPr id="1" name=""/>
+        <p:cNvGrpSpPr/>
+        <p:nvPr/>
+      </p:nvGrpSpPr>
+      <p:grpSpPr/>
+      <p:sp>
+        <p:nvSpPr>
+          <p:cNvPr id="2" name="Title 1"/>
+          <p:cNvSpPr>
+            <a:spLocks noGrp="1"/>
+          </p:cNvSpPr>
+          <p:nvPr>
+            <p:ph type="title"/>
+          </p:nvPr>
+        </p:nvSpPr>
+        <p:spPr/>
+        <p:txBody>
+          <a:bodyPr/>
+          <a:lstStyle/>
+          <a:p>
+            <a:r>
+              <a:t>Dios descendió, de gloria me llenó, (me llenó) cuando Jesús por gracia me salvó; (me salvó) fui ciego, me hizo ver, y en él renacer. Dios descendió y de gloria me llenó. (me llenó)</a:t>
+            </a:r>
+          </a:p>
+        </p:txBody>
+      </p:sp>
+    </p:spTree>
+  </p:cSld>
+  <p:clrMapOvr>
+    <a:masterClrMapping/>
+  </p:clrMapOvr>
+</p:sld>
+</file>
+
+<file path=ppt/slides/slide8.xml><?xml version="1.0" encoding="utf-8"?>
+<p:sld xmlns:a="http://schemas.openxmlformats.org/drawingml/2006/main" xmlns:p="http://schemas.openxmlformats.org/presentationml/2006/main" xmlns:r="http://schemas.openxmlformats.org/officeDocument/2006/relationships">
+  <p:cSld>
+    <p:spTree>
+      <p:nvGrpSpPr>
+        <p:cNvPr id="1" name=""/>
+        <p:cNvGrpSpPr/>
+        <p:nvPr/>
+      </p:nvGrpSpPr>
+      <p:grpSpPr/>
+      <p:sp>
+        <p:nvSpPr>
+          <p:cNvPr id="2" name="Title 1"/>
+          <p:cNvSpPr>
+            <a:spLocks noGrp="1"/>
+          </p:cNvSpPr>
+          <p:nvPr>
+            <p:ph type="title"/>
+          </p:nvPr>
+        </p:nvSpPr>
+        <p:spPr/>
+        <p:txBody>
+          <a:bodyPr/>
+          <a:lstStyle/>
+          <a:p>
+            <a:r>
+              <a:t>Nací de nuevo en virtud de Jesús, a la familia de Dios. Justificado por Cristo el señor, gozo la gran redención.</a:t>
+            </a:r>
+          </a:p>
+          <a:p>
+            <a:r>
+              <a:t> Bendito sea mi padre y Dios, que cuando vine con fe, fui adoptado por Cristo el amado, loores por siempre daré.</a:t>
+            </a:r>
+          </a:p>
+        </p:txBody>
+      </p:sp>
+    </p:spTree>
+  </p:cSld>
+  <p:clrMapOvr>
+    <a:masterClrMapping/>
+  </p:clrMapOvr>
+</p:sld>
+</file>
+
+<file path=ppt/slides/slide9.xml><?xml version="1.0" encoding="utf-8"?>
+<p:sld xmlns:a="http://schemas.openxmlformats.org/drawingml/2006/main" xmlns:p="http://schemas.openxmlformats.org/presentationml/2006/main" xmlns:r="http://schemas.openxmlformats.org/officeDocument/2006/relationships">
+  <p:cSld>
+    <p:spTree>
+      <p:nvGrpSpPr>
+        <p:cNvPr id="1" name=""/>
+        <p:cNvGrpSpPr/>
+        <p:nvPr/>
+      </p:nvGrpSpPr>
+      <p:grpSpPr/>
+      <p:sp>
+        <p:nvSpPr>
+          <p:cNvPr id="2" name="Title 1"/>
+          <p:cNvSpPr>
+            <a:spLocks noGrp="1"/>
+          </p:cNvSpPr>
+          <p:nvPr>
+            <p:ph type="title"/>
+          </p:nvPr>
+        </p:nvSpPr>
+        <p:spPr/>
+        <p:txBody>
+          <a:bodyPr/>
+          <a:lstStyle/>
+          <a:p>
+            <a:r>
+              <a:t>Dios descendió, de gloria me llenó, (me llenó) cuando Jesús por gracia me salvó; (me salvó) fui ciego, me hizo ver, y en él renacer. Dios descendió y de gloria me llenó. (me llenó)</a:t>
             </a:r>
           </a:p>
         </p:txBody>

</xml_diff>